<commit_message>
Interne Präsentationunterlagen Michael Kohlhepp
</commit_message>
<xml_diff>
--- a/UnsereProjektunterlagen/11.Projektdokumentationen/PräsentationGruppenIntern001.pptx
+++ b/UnsereProjektunterlagen/11.Projektdokumentationen/PräsentationGruppenIntern001.pptx
@@ -24,6 +24,7 @@
     <p:sldId id="272" r:id="rId18"/>
     <p:sldId id="273" r:id="rId19"/>
     <p:sldId id="274" r:id="rId20"/>
+    <p:sldId id="275" r:id="rId21"/>
   </p:sldIdLst>
   <p:sldSz cx="9144000" cy="6858000" type="screen4x3"/>
   <p:notesSz cx="6858000" cy="9144000"/>
@@ -1937,7 +1938,7 @@
           <a:p>
             <a:fld id="{5303484F-7B1F-4A3B-B470-9E2C390C8423}" type="datetimeFigureOut">
               <a:rPr lang="de-DE" smtClean="0"/>
-              <a:t>28.09.2016</a:t>
+              <a:t>29.09.2016</a:t>
             </a:fld>
             <a:endParaRPr lang="de-DE"/>
           </a:p>
@@ -2118,7 +2119,7 @@
           <a:p>
             <a:fld id="{5303484F-7B1F-4A3B-B470-9E2C390C8423}" type="datetimeFigureOut">
               <a:rPr lang="de-DE" smtClean="0"/>
-              <a:t>28.09.2016</a:t>
+              <a:t>29.09.2016</a:t>
             </a:fld>
             <a:endParaRPr lang="de-DE"/>
           </a:p>
@@ -2269,7 +2270,7 @@
           <a:p>
             <a:fld id="{5303484F-7B1F-4A3B-B470-9E2C390C8423}" type="datetimeFigureOut">
               <a:rPr lang="de-DE" smtClean="0"/>
-              <a:t>28.09.2016</a:t>
+              <a:t>29.09.2016</a:t>
             </a:fld>
             <a:endParaRPr lang="de-DE"/>
           </a:p>
@@ -4095,7 +4096,7 @@
           <a:p>
             <a:fld id="{5303484F-7B1F-4A3B-B470-9E2C390C8423}" type="datetimeFigureOut">
               <a:rPr lang="de-DE" smtClean="0"/>
-              <a:t>28.09.2016</a:t>
+              <a:t>29.09.2016</a:t>
             </a:fld>
             <a:endParaRPr lang="de-DE"/>
           </a:p>
@@ -5981,7 +5982,7 @@
           <a:p>
             <a:fld id="{5303484F-7B1F-4A3B-B470-9E2C390C8423}" type="datetimeFigureOut">
               <a:rPr lang="de-DE" smtClean="0"/>
-              <a:t>28.09.2016</a:t>
+              <a:t>29.09.2016</a:t>
             </a:fld>
             <a:endParaRPr lang="de-DE"/>
           </a:p>
@@ -6094,7 +6095,7 @@
           <a:p>
             <a:fld id="{5303484F-7B1F-4A3B-B470-9E2C390C8423}" type="datetimeFigureOut">
               <a:rPr lang="de-DE" smtClean="0"/>
-              <a:t>28.09.2016</a:t>
+              <a:t>29.09.2016</a:t>
             </a:fld>
             <a:endParaRPr lang="de-DE"/>
           </a:p>
@@ -6635,7 +6636,7 @@
           <a:p>
             <a:fld id="{5303484F-7B1F-4A3B-B470-9E2C390C8423}" type="datetimeFigureOut">
               <a:rPr lang="de-DE" smtClean="0"/>
-              <a:t>28.09.2016</a:t>
+              <a:t>29.09.2016</a:t>
             </a:fld>
             <a:endParaRPr lang="de-DE"/>
           </a:p>
@@ -6748,7 +6749,7 @@
           <a:p>
             <a:fld id="{5303484F-7B1F-4A3B-B470-9E2C390C8423}" type="datetimeFigureOut">
               <a:rPr lang="de-DE" smtClean="0"/>
-              <a:t>28.09.2016</a:t>
+              <a:t>29.09.2016</a:t>
             </a:fld>
             <a:endParaRPr lang="de-DE"/>
           </a:p>
@@ -8459,7 +8460,7 @@
           <a:p>
             <a:fld id="{5303484F-7B1F-4A3B-B470-9E2C390C8423}" type="datetimeFigureOut">
               <a:rPr lang="de-DE" smtClean="0"/>
-              <a:t>28.09.2016</a:t>
+              <a:t>29.09.2016</a:t>
             </a:fld>
             <a:endParaRPr lang="de-DE"/>
           </a:p>
@@ -8610,7 +8611,7 @@
           <a:p>
             <a:fld id="{5303484F-7B1F-4A3B-B470-9E2C390C8423}" type="datetimeFigureOut">
               <a:rPr lang="de-DE" smtClean="0"/>
-              <a:t>28.09.2016</a:t>
+              <a:t>29.09.2016</a:t>
             </a:fld>
             <a:endParaRPr lang="de-DE"/>
           </a:p>
@@ -12225,7 +12226,7 @@
           <a:p>
             <a:fld id="{5303484F-7B1F-4A3B-B470-9E2C390C8423}" type="datetimeFigureOut">
               <a:rPr lang="de-DE" smtClean="0"/>
-              <a:t>28.09.2016</a:t>
+              <a:t>29.09.2016</a:t>
             </a:fld>
             <a:endParaRPr lang="de-DE"/>
           </a:p>
@@ -14084,7 +14085,7 @@
           <a:p>
             <a:fld id="{5303484F-7B1F-4A3B-B470-9E2C390C8423}" type="datetimeFigureOut">
               <a:rPr lang="de-DE" smtClean="0"/>
-              <a:t>28.09.2016</a:t>
+              <a:t>29.09.2016</a:t>
             </a:fld>
             <a:endParaRPr lang="de-DE"/>
           </a:p>
@@ -15180,7 +15181,12 @@
             <p:ph idx="1"/>
           </p:nvPr>
         </p:nvSpPr>
-        <p:spPr/>
+        <p:spPr>
+          <a:xfrm>
+            <a:off x="872067" y="2675466"/>
+            <a:ext cx="7408333" cy="4065901"/>
+          </a:xfrm>
+        </p:spPr>
         <p:txBody>
           <a:bodyPr/>
           <a:lstStyle/>
@@ -15229,6 +15235,47 @@
           </a:p>
         </p:txBody>
       </p:sp>
+      <p:pic>
+        <p:nvPicPr>
+          <p:cNvPr id="2050" name="Picture 2" descr="C:\Users\User\.VirtualBox\Share\Git_Projekte\LOTTO\UnsereProjektunterlagen\Balkendiagramm.JPG"/>
+          <p:cNvPicPr>
+            <a:picLocks noChangeAspect="1" noChangeArrowheads="1"/>
+          </p:cNvPicPr>
+          <p:nvPr/>
+        </p:nvPicPr>
+        <p:blipFill>
+          <a:blip r:embed="rId2" cstate="print">
+            <a:extLst>
+              <a:ext uri="{28A0092B-C50C-407E-A947-70E740481C1C}">
+                <a14:useLocalDpi xmlns:a14="http://schemas.microsoft.com/office/drawing/2010/main" val="0"/>
+              </a:ext>
+            </a:extLst>
+          </a:blip>
+          <a:srcRect/>
+          <a:stretch>
+            <a:fillRect/>
+          </a:stretch>
+        </p:blipFill>
+        <p:spPr bwMode="auto">
+          <a:xfrm>
+            <a:off x="2262840" y="4725144"/>
+            <a:ext cx="4037352" cy="1934328"/>
+          </a:xfrm>
+          <a:prstGeom prst="rect">
+            <a:avLst/>
+          </a:prstGeom>
+          <a:noFill/>
+          <a:extLst>
+            <a:ext uri="{909E8E84-426E-40DD-AFC4-6F175D3DCCD1}">
+              <a14:hiddenFill xmlns:a14="http://schemas.microsoft.com/office/drawing/2010/main">
+                <a:solidFill>
+                  <a:srgbClr val="FFFFFF"/>
+                </a:solidFill>
+              </a14:hiddenFill>
+            </a:ext>
+          </a:extLst>
+        </p:spPr>
+      </p:pic>
     </p:spTree>
     <p:extLst>
       <p:ext uri="{BB962C8B-B14F-4D97-AF65-F5344CB8AC3E}">
@@ -16161,6 +16208,163 @@
 </p:sld>
 </file>
 
+<file path=ppt/slides/slide20.xml><?xml version="1.0" encoding="utf-8"?>
+<p:sld xmlns:a="http://schemas.openxmlformats.org/drawingml/2006/main" xmlns:r="http://schemas.openxmlformats.org/officeDocument/2006/relationships" xmlns:p="http://schemas.openxmlformats.org/presentationml/2006/main">
+  <p:cSld>
+    <p:spTree>
+      <p:nvGrpSpPr>
+        <p:cNvPr id="1" name=""/>
+        <p:cNvGrpSpPr/>
+        <p:nvPr/>
+      </p:nvGrpSpPr>
+      <p:grpSpPr>
+        <a:xfrm>
+          <a:off x="0" y="0"/>
+          <a:ext cx="0" cy="0"/>
+          <a:chOff x="0" y="0"/>
+          <a:chExt cx="0" cy="0"/>
+        </a:xfrm>
+      </p:grpSpPr>
+      <p:sp>
+        <p:nvSpPr>
+          <p:cNvPr id="2" name="Inhaltsplatzhalter 1"/>
+          <p:cNvSpPr>
+            <a:spLocks noGrp="1"/>
+          </p:cNvSpPr>
+          <p:nvPr>
+            <p:ph idx="1"/>
+          </p:nvPr>
+        </p:nvSpPr>
+        <p:spPr>
+          <a:xfrm>
+            <a:off x="899592" y="2636912"/>
+            <a:ext cx="7488831" cy="3882744"/>
+          </a:xfrm>
+        </p:spPr>
+        <p:txBody>
+          <a:bodyPr/>
+          <a:lstStyle/>
+          <a:p>
+            <a:endParaRPr lang="de-DE" dirty="0"/>
+          </a:p>
+        </p:txBody>
+      </p:sp>
+      <p:sp>
+        <p:nvSpPr>
+          <p:cNvPr id="3" name="Titel 2"/>
+          <p:cNvSpPr>
+            <a:spLocks noGrp="1"/>
+          </p:cNvSpPr>
+          <p:nvPr>
+            <p:ph type="title"/>
+          </p:nvPr>
+        </p:nvSpPr>
+        <p:spPr/>
+        <p:txBody>
+          <a:bodyPr>
+            <a:normAutofit fontScale="90000"/>
+          </a:bodyPr>
+          <a:lstStyle/>
+          <a:p>
+            <a:endParaRPr lang="de-DE"/>
+          </a:p>
+        </p:txBody>
+      </p:sp>
+      <p:pic>
+        <p:nvPicPr>
+          <p:cNvPr id="3074" name="Picture 2" descr="C:\Users\User\.VirtualBox\Share\Git_Projekte\LOTTO\UnsereProjektunterlagen\GUI screenshot tab_mein_Lottoschein.jpg"/>
+          <p:cNvPicPr>
+            <a:picLocks noChangeAspect="1" noChangeArrowheads="1"/>
+          </p:cNvPicPr>
+          <p:nvPr/>
+        </p:nvPicPr>
+        <p:blipFill>
+          <a:blip r:embed="rId2">
+            <a:extLst>
+              <a:ext uri="{28A0092B-C50C-407E-A947-70E740481C1C}">
+                <a14:useLocalDpi xmlns:a14="http://schemas.microsoft.com/office/drawing/2010/main" val="0"/>
+              </a:ext>
+            </a:extLst>
+          </a:blip>
+          <a:srcRect/>
+          <a:stretch>
+            <a:fillRect/>
+          </a:stretch>
+        </p:blipFill>
+        <p:spPr bwMode="auto">
+          <a:xfrm>
+            <a:off x="971600" y="2708920"/>
+            <a:ext cx="3312368" cy="3744416"/>
+          </a:xfrm>
+          <a:prstGeom prst="rect">
+            <a:avLst/>
+          </a:prstGeom>
+          <a:noFill/>
+          <a:extLst>
+            <a:ext uri="{909E8E84-426E-40DD-AFC4-6F175D3DCCD1}">
+              <a14:hiddenFill xmlns:a14="http://schemas.microsoft.com/office/drawing/2010/main">
+                <a:solidFill>
+                  <a:srgbClr val="FFFFFF"/>
+                </a:solidFill>
+              </a14:hiddenFill>
+            </a:ext>
+          </a:extLst>
+        </p:spPr>
+      </p:pic>
+      <p:pic>
+        <p:nvPicPr>
+          <p:cNvPr id="3075" name="Picture 3" descr="C:\Users\User\.VirtualBox\Share\Git_Projekte\LOTTO\UnsereProjektunterlagen\GUI screenshot tab_Aktuelle_Ziehung.jpg"/>
+          <p:cNvPicPr>
+            <a:picLocks noChangeAspect="1" noChangeArrowheads="1"/>
+          </p:cNvPicPr>
+          <p:nvPr/>
+        </p:nvPicPr>
+        <p:blipFill>
+          <a:blip r:embed="rId3">
+            <a:extLst>
+              <a:ext uri="{28A0092B-C50C-407E-A947-70E740481C1C}">
+                <a14:useLocalDpi xmlns:a14="http://schemas.microsoft.com/office/drawing/2010/main" val="0"/>
+              </a:ext>
+            </a:extLst>
+          </a:blip>
+          <a:srcRect/>
+          <a:stretch>
+            <a:fillRect/>
+          </a:stretch>
+        </p:blipFill>
+        <p:spPr bwMode="auto">
+          <a:xfrm>
+            <a:off x="4283968" y="2708921"/>
+            <a:ext cx="3384376" cy="3744416"/>
+          </a:xfrm>
+          <a:prstGeom prst="rect">
+            <a:avLst/>
+          </a:prstGeom>
+          <a:noFill/>
+          <a:extLst>
+            <a:ext uri="{909E8E84-426E-40DD-AFC4-6F175D3DCCD1}">
+              <a14:hiddenFill xmlns:a14="http://schemas.microsoft.com/office/drawing/2010/main">
+                <a:solidFill>
+                  <a:srgbClr val="FFFFFF"/>
+                </a:solidFill>
+              </a14:hiddenFill>
+            </a:ext>
+          </a:extLst>
+        </p:spPr>
+      </p:pic>
+    </p:spTree>
+    <p:extLst>
+      <p:ext uri="{BB962C8B-B14F-4D97-AF65-F5344CB8AC3E}">
+        <p14:creationId xmlns:p14="http://schemas.microsoft.com/office/powerpoint/2010/main" val="1134313947"/>
+      </p:ext>
+    </p:extLst>
+  </p:cSld>
+  <p:clrMapOvr>
+    <a:masterClrMapping/>
+  </p:clrMapOvr>
+</p:sld>
+</file>
+
 <file path=ppt/slides/slide3.xml><?xml version="1.0" encoding="utf-8"?>
 <p:sld xmlns:a="http://schemas.openxmlformats.org/drawingml/2006/main" xmlns:r="http://schemas.openxmlformats.org/officeDocument/2006/relationships" xmlns:p="http://schemas.openxmlformats.org/presentationml/2006/main">
   <p:cSld>
@@ -16258,29 +16462,8 @@
             </a:r>
           </a:p>
           <a:p>
-            <a:pPr marL="457200" indent="-457200">
-              <a:buFont typeface="+mj-lt"/>
-              <a:buAutoNum type="arabicPeriod" startAt="17"/>
-            </a:pPr>
-            <a:r>
-              <a:rPr lang="de-DE" dirty="0" smtClean="0"/>
-              <a:t>Abnahme </a:t>
-            </a:r>
-          </a:p>
-          <a:p>
-            <a:pPr marL="457200" indent="-457200">
-              <a:buFont typeface="+mj-lt"/>
-              <a:buAutoNum type="arabicPeriod" startAt="17"/>
-            </a:pPr>
-            <a:r>
-              <a:rPr lang="de-DE" dirty="0" smtClean="0"/>
-              <a:t>Abschlussbericht</a:t>
-            </a:r>
-          </a:p>
-          <a:p>
-            <a:pPr marL="457200" indent="-457200">
-              <a:buFont typeface="+mj-lt"/>
-              <a:buAutoNum type="arabicPeriod" startAt="13"/>
+            <a:pPr marL="0" indent="0">
+              <a:buNone/>
             </a:pPr>
             <a:endParaRPr lang="de-DE" dirty="0"/>
           </a:p>
@@ -16767,7 +16950,12 @@
             <p:ph idx="1"/>
           </p:nvPr>
         </p:nvSpPr>
-        <p:spPr/>
+        <p:spPr>
+          <a:xfrm>
+            <a:off x="872067" y="2675466"/>
+            <a:ext cx="7516357" cy="3921885"/>
+          </a:xfrm>
+        </p:spPr>
         <p:txBody>
           <a:bodyPr/>
           <a:lstStyle/>
@@ -16818,6 +17006,47 @@
           </a:p>
         </p:txBody>
       </p:sp>
+      <p:pic>
+        <p:nvPicPr>
+          <p:cNvPr id="1026" name="Picture 2" descr="C:\Users\User\.VirtualBox\Share\Git_Projekte\LOTTO\UnsereProjektunterlagen\UML.JPG"/>
+          <p:cNvPicPr>
+            <a:picLocks noChangeAspect="1" noChangeArrowheads="1"/>
+          </p:cNvPicPr>
+          <p:nvPr/>
+        </p:nvPicPr>
+        <p:blipFill>
+          <a:blip r:embed="rId2">
+            <a:extLst>
+              <a:ext uri="{28A0092B-C50C-407E-A947-70E740481C1C}">
+                <a14:useLocalDpi xmlns:a14="http://schemas.microsoft.com/office/drawing/2010/main" val="0"/>
+              </a:ext>
+            </a:extLst>
+          </a:blip>
+          <a:srcRect/>
+          <a:stretch>
+            <a:fillRect/>
+          </a:stretch>
+        </p:blipFill>
+        <p:spPr bwMode="auto">
+          <a:xfrm>
+            <a:off x="1691680" y="4365104"/>
+            <a:ext cx="4752528" cy="2304256"/>
+          </a:xfrm>
+          <a:prstGeom prst="rect">
+            <a:avLst/>
+          </a:prstGeom>
+          <a:noFill/>
+          <a:extLst>
+            <a:ext uri="{909E8E84-426E-40DD-AFC4-6F175D3DCCD1}">
+              <a14:hiddenFill xmlns:a14="http://schemas.microsoft.com/office/drawing/2010/main">
+                <a:solidFill>
+                  <a:srgbClr val="FFFFFF"/>
+                </a:solidFill>
+              </a14:hiddenFill>
+            </a:ext>
+          </a:extLst>
+        </p:spPr>
+      </p:pic>
     </p:spTree>
     <p:extLst>
       <p:ext uri="{BB962C8B-B14F-4D97-AF65-F5344CB8AC3E}">

</xml_diff>

<commit_message>
Öffentliche Präsentation Joachim Harms
</commit_message>
<xml_diff>
--- a/UnsereProjektunterlagen/11.Projektdokumentationen/PräsentationGruppenIntern001.pptx
+++ b/UnsereProjektunterlagen/11.Projektdokumentationen/PräsentationGruppenIntern001.pptx
@@ -24,7 +24,6 @@
     <p:sldId id="272" r:id="rId18"/>
     <p:sldId id="273" r:id="rId19"/>
     <p:sldId id="274" r:id="rId20"/>
-    <p:sldId id="275" r:id="rId21"/>
   </p:sldIdLst>
   <p:sldSz cx="9144000" cy="6858000" type="screen4x3"/>
   <p:notesSz cx="6858000" cy="9144000"/>
@@ -1938,7 +1937,7 @@
           <a:p>
             <a:fld id="{5303484F-7B1F-4A3B-B470-9E2C390C8423}" type="datetimeFigureOut">
               <a:rPr lang="de-DE" smtClean="0"/>
-              <a:t>29.09.2016</a:t>
+              <a:t>28.09.2016</a:t>
             </a:fld>
             <a:endParaRPr lang="de-DE"/>
           </a:p>
@@ -2119,7 +2118,7 @@
           <a:p>
             <a:fld id="{5303484F-7B1F-4A3B-B470-9E2C390C8423}" type="datetimeFigureOut">
               <a:rPr lang="de-DE" smtClean="0"/>
-              <a:t>29.09.2016</a:t>
+              <a:t>28.09.2016</a:t>
             </a:fld>
             <a:endParaRPr lang="de-DE"/>
           </a:p>
@@ -2270,7 +2269,7 @@
           <a:p>
             <a:fld id="{5303484F-7B1F-4A3B-B470-9E2C390C8423}" type="datetimeFigureOut">
               <a:rPr lang="de-DE" smtClean="0"/>
-              <a:t>29.09.2016</a:t>
+              <a:t>28.09.2016</a:t>
             </a:fld>
             <a:endParaRPr lang="de-DE"/>
           </a:p>
@@ -4096,7 +4095,7 @@
           <a:p>
             <a:fld id="{5303484F-7B1F-4A3B-B470-9E2C390C8423}" type="datetimeFigureOut">
               <a:rPr lang="de-DE" smtClean="0"/>
-              <a:t>29.09.2016</a:t>
+              <a:t>28.09.2016</a:t>
             </a:fld>
             <a:endParaRPr lang="de-DE"/>
           </a:p>
@@ -5982,7 +5981,7 @@
           <a:p>
             <a:fld id="{5303484F-7B1F-4A3B-B470-9E2C390C8423}" type="datetimeFigureOut">
               <a:rPr lang="de-DE" smtClean="0"/>
-              <a:t>29.09.2016</a:t>
+              <a:t>28.09.2016</a:t>
             </a:fld>
             <a:endParaRPr lang="de-DE"/>
           </a:p>
@@ -6095,7 +6094,7 @@
           <a:p>
             <a:fld id="{5303484F-7B1F-4A3B-B470-9E2C390C8423}" type="datetimeFigureOut">
               <a:rPr lang="de-DE" smtClean="0"/>
-              <a:t>29.09.2016</a:t>
+              <a:t>28.09.2016</a:t>
             </a:fld>
             <a:endParaRPr lang="de-DE"/>
           </a:p>
@@ -6636,7 +6635,7 @@
           <a:p>
             <a:fld id="{5303484F-7B1F-4A3B-B470-9E2C390C8423}" type="datetimeFigureOut">
               <a:rPr lang="de-DE" smtClean="0"/>
-              <a:t>29.09.2016</a:t>
+              <a:t>28.09.2016</a:t>
             </a:fld>
             <a:endParaRPr lang="de-DE"/>
           </a:p>
@@ -6749,7 +6748,7 @@
           <a:p>
             <a:fld id="{5303484F-7B1F-4A3B-B470-9E2C390C8423}" type="datetimeFigureOut">
               <a:rPr lang="de-DE" smtClean="0"/>
-              <a:t>29.09.2016</a:t>
+              <a:t>28.09.2016</a:t>
             </a:fld>
             <a:endParaRPr lang="de-DE"/>
           </a:p>
@@ -8460,7 +8459,7 @@
           <a:p>
             <a:fld id="{5303484F-7B1F-4A3B-B470-9E2C390C8423}" type="datetimeFigureOut">
               <a:rPr lang="de-DE" smtClean="0"/>
-              <a:t>29.09.2016</a:t>
+              <a:t>28.09.2016</a:t>
             </a:fld>
             <a:endParaRPr lang="de-DE"/>
           </a:p>
@@ -8611,7 +8610,7 @@
           <a:p>
             <a:fld id="{5303484F-7B1F-4A3B-B470-9E2C390C8423}" type="datetimeFigureOut">
               <a:rPr lang="de-DE" smtClean="0"/>
-              <a:t>29.09.2016</a:t>
+              <a:t>28.09.2016</a:t>
             </a:fld>
             <a:endParaRPr lang="de-DE"/>
           </a:p>
@@ -12226,7 +12225,7 @@
           <a:p>
             <a:fld id="{5303484F-7B1F-4A3B-B470-9E2C390C8423}" type="datetimeFigureOut">
               <a:rPr lang="de-DE" smtClean="0"/>
-              <a:t>29.09.2016</a:t>
+              <a:t>28.09.2016</a:t>
             </a:fld>
             <a:endParaRPr lang="de-DE"/>
           </a:p>
@@ -14085,7 +14084,7 @@
           <a:p>
             <a:fld id="{5303484F-7B1F-4A3B-B470-9E2C390C8423}" type="datetimeFigureOut">
               <a:rPr lang="de-DE" smtClean="0"/>
-              <a:t>29.09.2016</a:t>
+              <a:t>28.09.2016</a:t>
             </a:fld>
             <a:endParaRPr lang="de-DE"/>
           </a:p>
@@ -15181,12 +15180,7 @@
             <p:ph idx="1"/>
           </p:nvPr>
         </p:nvSpPr>
-        <p:spPr>
-          <a:xfrm>
-            <a:off x="872067" y="2675466"/>
-            <a:ext cx="7408333" cy="4065901"/>
-          </a:xfrm>
-        </p:spPr>
+        <p:spPr/>
         <p:txBody>
           <a:bodyPr/>
           <a:lstStyle/>
@@ -15235,47 +15229,6 @@
           </a:p>
         </p:txBody>
       </p:sp>
-      <p:pic>
-        <p:nvPicPr>
-          <p:cNvPr id="2050" name="Picture 2" descr="C:\Users\User\.VirtualBox\Share\Git_Projekte\LOTTO\UnsereProjektunterlagen\Balkendiagramm.JPG"/>
-          <p:cNvPicPr>
-            <a:picLocks noChangeAspect="1" noChangeArrowheads="1"/>
-          </p:cNvPicPr>
-          <p:nvPr/>
-        </p:nvPicPr>
-        <p:blipFill>
-          <a:blip r:embed="rId2" cstate="print">
-            <a:extLst>
-              <a:ext uri="{28A0092B-C50C-407E-A947-70E740481C1C}">
-                <a14:useLocalDpi xmlns:a14="http://schemas.microsoft.com/office/drawing/2010/main" val="0"/>
-              </a:ext>
-            </a:extLst>
-          </a:blip>
-          <a:srcRect/>
-          <a:stretch>
-            <a:fillRect/>
-          </a:stretch>
-        </p:blipFill>
-        <p:spPr bwMode="auto">
-          <a:xfrm>
-            <a:off x="2262840" y="4725144"/>
-            <a:ext cx="4037352" cy="1934328"/>
-          </a:xfrm>
-          <a:prstGeom prst="rect">
-            <a:avLst/>
-          </a:prstGeom>
-          <a:noFill/>
-          <a:extLst>
-            <a:ext uri="{909E8E84-426E-40DD-AFC4-6F175D3DCCD1}">
-              <a14:hiddenFill xmlns:a14="http://schemas.microsoft.com/office/drawing/2010/main">
-                <a:solidFill>
-                  <a:srgbClr val="FFFFFF"/>
-                </a:solidFill>
-              </a14:hiddenFill>
-            </a:ext>
-          </a:extLst>
-        </p:spPr>
-      </p:pic>
     </p:spTree>
     <p:extLst>
       <p:ext uri="{BB962C8B-B14F-4D97-AF65-F5344CB8AC3E}">
@@ -16208,163 +16161,6 @@
 </p:sld>
 </file>
 
-<file path=ppt/slides/slide20.xml><?xml version="1.0" encoding="utf-8"?>
-<p:sld xmlns:a="http://schemas.openxmlformats.org/drawingml/2006/main" xmlns:r="http://schemas.openxmlformats.org/officeDocument/2006/relationships" xmlns:p="http://schemas.openxmlformats.org/presentationml/2006/main">
-  <p:cSld>
-    <p:spTree>
-      <p:nvGrpSpPr>
-        <p:cNvPr id="1" name=""/>
-        <p:cNvGrpSpPr/>
-        <p:nvPr/>
-      </p:nvGrpSpPr>
-      <p:grpSpPr>
-        <a:xfrm>
-          <a:off x="0" y="0"/>
-          <a:ext cx="0" cy="0"/>
-          <a:chOff x="0" y="0"/>
-          <a:chExt cx="0" cy="0"/>
-        </a:xfrm>
-      </p:grpSpPr>
-      <p:sp>
-        <p:nvSpPr>
-          <p:cNvPr id="2" name="Inhaltsplatzhalter 1"/>
-          <p:cNvSpPr>
-            <a:spLocks noGrp="1"/>
-          </p:cNvSpPr>
-          <p:nvPr>
-            <p:ph idx="1"/>
-          </p:nvPr>
-        </p:nvSpPr>
-        <p:spPr>
-          <a:xfrm>
-            <a:off x="899592" y="2636912"/>
-            <a:ext cx="7488831" cy="3882744"/>
-          </a:xfrm>
-        </p:spPr>
-        <p:txBody>
-          <a:bodyPr/>
-          <a:lstStyle/>
-          <a:p>
-            <a:endParaRPr lang="de-DE" dirty="0"/>
-          </a:p>
-        </p:txBody>
-      </p:sp>
-      <p:sp>
-        <p:nvSpPr>
-          <p:cNvPr id="3" name="Titel 2"/>
-          <p:cNvSpPr>
-            <a:spLocks noGrp="1"/>
-          </p:cNvSpPr>
-          <p:nvPr>
-            <p:ph type="title"/>
-          </p:nvPr>
-        </p:nvSpPr>
-        <p:spPr/>
-        <p:txBody>
-          <a:bodyPr>
-            <a:normAutofit fontScale="90000"/>
-          </a:bodyPr>
-          <a:lstStyle/>
-          <a:p>
-            <a:endParaRPr lang="de-DE"/>
-          </a:p>
-        </p:txBody>
-      </p:sp>
-      <p:pic>
-        <p:nvPicPr>
-          <p:cNvPr id="3074" name="Picture 2" descr="C:\Users\User\.VirtualBox\Share\Git_Projekte\LOTTO\UnsereProjektunterlagen\GUI screenshot tab_mein_Lottoschein.jpg"/>
-          <p:cNvPicPr>
-            <a:picLocks noChangeAspect="1" noChangeArrowheads="1"/>
-          </p:cNvPicPr>
-          <p:nvPr/>
-        </p:nvPicPr>
-        <p:blipFill>
-          <a:blip r:embed="rId2">
-            <a:extLst>
-              <a:ext uri="{28A0092B-C50C-407E-A947-70E740481C1C}">
-                <a14:useLocalDpi xmlns:a14="http://schemas.microsoft.com/office/drawing/2010/main" val="0"/>
-              </a:ext>
-            </a:extLst>
-          </a:blip>
-          <a:srcRect/>
-          <a:stretch>
-            <a:fillRect/>
-          </a:stretch>
-        </p:blipFill>
-        <p:spPr bwMode="auto">
-          <a:xfrm>
-            <a:off x="971600" y="2708920"/>
-            <a:ext cx="3312368" cy="3744416"/>
-          </a:xfrm>
-          <a:prstGeom prst="rect">
-            <a:avLst/>
-          </a:prstGeom>
-          <a:noFill/>
-          <a:extLst>
-            <a:ext uri="{909E8E84-426E-40DD-AFC4-6F175D3DCCD1}">
-              <a14:hiddenFill xmlns:a14="http://schemas.microsoft.com/office/drawing/2010/main">
-                <a:solidFill>
-                  <a:srgbClr val="FFFFFF"/>
-                </a:solidFill>
-              </a14:hiddenFill>
-            </a:ext>
-          </a:extLst>
-        </p:spPr>
-      </p:pic>
-      <p:pic>
-        <p:nvPicPr>
-          <p:cNvPr id="3075" name="Picture 3" descr="C:\Users\User\.VirtualBox\Share\Git_Projekte\LOTTO\UnsereProjektunterlagen\GUI screenshot tab_Aktuelle_Ziehung.jpg"/>
-          <p:cNvPicPr>
-            <a:picLocks noChangeAspect="1" noChangeArrowheads="1"/>
-          </p:cNvPicPr>
-          <p:nvPr/>
-        </p:nvPicPr>
-        <p:blipFill>
-          <a:blip r:embed="rId3">
-            <a:extLst>
-              <a:ext uri="{28A0092B-C50C-407E-A947-70E740481C1C}">
-                <a14:useLocalDpi xmlns:a14="http://schemas.microsoft.com/office/drawing/2010/main" val="0"/>
-              </a:ext>
-            </a:extLst>
-          </a:blip>
-          <a:srcRect/>
-          <a:stretch>
-            <a:fillRect/>
-          </a:stretch>
-        </p:blipFill>
-        <p:spPr bwMode="auto">
-          <a:xfrm>
-            <a:off x="4283968" y="2708921"/>
-            <a:ext cx="3384376" cy="3744416"/>
-          </a:xfrm>
-          <a:prstGeom prst="rect">
-            <a:avLst/>
-          </a:prstGeom>
-          <a:noFill/>
-          <a:extLst>
-            <a:ext uri="{909E8E84-426E-40DD-AFC4-6F175D3DCCD1}">
-              <a14:hiddenFill xmlns:a14="http://schemas.microsoft.com/office/drawing/2010/main">
-                <a:solidFill>
-                  <a:srgbClr val="FFFFFF"/>
-                </a:solidFill>
-              </a14:hiddenFill>
-            </a:ext>
-          </a:extLst>
-        </p:spPr>
-      </p:pic>
-    </p:spTree>
-    <p:extLst>
-      <p:ext uri="{BB962C8B-B14F-4D97-AF65-F5344CB8AC3E}">
-        <p14:creationId xmlns:p14="http://schemas.microsoft.com/office/powerpoint/2010/main" val="1134313947"/>
-      </p:ext>
-    </p:extLst>
-  </p:cSld>
-  <p:clrMapOvr>
-    <a:masterClrMapping/>
-  </p:clrMapOvr>
-</p:sld>
-</file>
-
 <file path=ppt/slides/slide3.xml><?xml version="1.0" encoding="utf-8"?>
 <p:sld xmlns:a="http://schemas.openxmlformats.org/drawingml/2006/main" xmlns:r="http://schemas.openxmlformats.org/officeDocument/2006/relationships" xmlns:p="http://schemas.openxmlformats.org/presentationml/2006/main">
   <p:cSld>
@@ -16462,8 +16258,29 @@
             </a:r>
           </a:p>
           <a:p>
-            <a:pPr marL="0" indent="0">
-              <a:buNone/>
+            <a:pPr marL="457200" indent="-457200">
+              <a:buFont typeface="+mj-lt"/>
+              <a:buAutoNum type="arabicPeriod" startAt="17"/>
+            </a:pPr>
+            <a:r>
+              <a:rPr lang="de-DE" dirty="0" smtClean="0"/>
+              <a:t>Abnahme </a:t>
+            </a:r>
+          </a:p>
+          <a:p>
+            <a:pPr marL="457200" indent="-457200">
+              <a:buFont typeface="+mj-lt"/>
+              <a:buAutoNum type="arabicPeriod" startAt="17"/>
+            </a:pPr>
+            <a:r>
+              <a:rPr lang="de-DE" dirty="0" smtClean="0"/>
+              <a:t>Abschlussbericht</a:t>
+            </a:r>
+          </a:p>
+          <a:p>
+            <a:pPr marL="457200" indent="-457200">
+              <a:buFont typeface="+mj-lt"/>
+              <a:buAutoNum type="arabicPeriod" startAt="13"/>
             </a:pPr>
             <a:endParaRPr lang="de-DE" dirty="0"/>
           </a:p>
@@ -16950,12 +16767,7 @@
             <p:ph idx="1"/>
           </p:nvPr>
         </p:nvSpPr>
-        <p:spPr>
-          <a:xfrm>
-            <a:off x="872067" y="2675466"/>
-            <a:ext cx="7516357" cy="3921885"/>
-          </a:xfrm>
-        </p:spPr>
+        <p:spPr/>
         <p:txBody>
           <a:bodyPr/>
           <a:lstStyle/>
@@ -17006,47 +16818,6 @@
           </a:p>
         </p:txBody>
       </p:sp>
-      <p:pic>
-        <p:nvPicPr>
-          <p:cNvPr id="1026" name="Picture 2" descr="C:\Users\User\.VirtualBox\Share\Git_Projekte\LOTTO\UnsereProjektunterlagen\UML.JPG"/>
-          <p:cNvPicPr>
-            <a:picLocks noChangeAspect="1" noChangeArrowheads="1"/>
-          </p:cNvPicPr>
-          <p:nvPr/>
-        </p:nvPicPr>
-        <p:blipFill>
-          <a:blip r:embed="rId2">
-            <a:extLst>
-              <a:ext uri="{28A0092B-C50C-407E-A947-70E740481C1C}">
-                <a14:useLocalDpi xmlns:a14="http://schemas.microsoft.com/office/drawing/2010/main" val="0"/>
-              </a:ext>
-            </a:extLst>
-          </a:blip>
-          <a:srcRect/>
-          <a:stretch>
-            <a:fillRect/>
-          </a:stretch>
-        </p:blipFill>
-        <p:spPr bwMode="auto">
-          <a:xfrm>
-            <a:off x="1691680" y="4365104"/>
-            <a:ext cx="4752528" cy="2304256"/>
-          </a:xfrm>
-          <a:prstGeom prst="rect">
-            <a:avLst/>
-          </a:prstGeom>
-          <a:noFill/>
-          <a:extLst>
-            <a:ext uri="{909E8E84-426E-40DD-AFC4-6F175D3DCCD1}">
-              <a14:hiddenFill xmlns:a14="http://schemas.microsoft.com/office/drawing/2010/main">
-                <a:solidFill>
-                  <a:srgbClr val="FFFFFF"/>
-                </a:solidFill>
-              </a14:hiddenFill>
-            </a:ext>
-          </a:extLst>
-        </p:spPr>
-      </p:pic>
     </p:spTree>
     <p:extLst>
       <p:ext uri="{BB962C8B-B14F-4D97-AF65-F5344CB8AC3E}">

</xml_diff>

<commit_message>
Ordnerstruktur ueberarbeitet Joachim Harms
</commit_message>
<xml_diff>
--- a/UnsereProjektunterlagen/11.Projektdokumentationen/PräsentationGruppenIntern001.pptx
+++ b/UnsereProjektunterlagen/11.Projektdokumentationen/PräsentationGruppenIntern001.pptx
@@ -1937,7 +1937,7 @@
           <a:p>
             <a:fld id="{5303484F-7B1F-4A3B-B470-9E2C390C8423}" type="datetimeFigureOut">
               <a:rPr lang="de-DE" smtClean="0"/>
-              <a:t>28.09.2016</a:t>
+              <a:t>30.09.2016</a:t>
             </a:fld>
             <a:endParaRPr lang="de-DE"/>
           </a:p>
@@ -2118,7 +2118,7 @@
           <a:p>
             <a:fld id="{5303484F-7B1F-4A3B-B470-9E2C390C8423}" type="datetimeFigureOut">
               <a:rPr lang="de-DE" smtClean="0"/>
-              <a:t>28.09.2016</a:t>
+              <a:t>30.09.2016</a:t>
             </a:fld>
             <a:endParaRPr lang="de-DE"/>
           </a:p>
@@ -2269,7 +2269,7 @@
           <a:p>
             <a:fld id="{5303484F-7B1F-4A3B-B470-9E2C390C8423}" type="datetimeFigureOut">
               <a:rPr lang="de-DE" smtClean="0"/>
-              <a:t>28.09.2016</a:t>
+              <a:t>30.09.2016</a:t>
             </a:fld>
             <a:endParaRPr lang="de-DE"/>
           </a:p>
@@ -4095,7 +4095,7 @@
           <a:p>
             <a:fld id="{5303484F-7B1F-4A3B-B470-9E2C390C8423}" type="datetimeFigureOut">
               <a:rPr lang="de-DE" smtClean="0"/>
-              <a:t>28.09.2016</a:t>
+              <a:t>30.09.2016</a:t>
             </a:fld>
             <a:endParaRPr lang="de-DE"/>
           </a:p>
@@ -5981,7 +5981,7 @@
           <a:p>
             <a:fld id="{5303484F-7B1F-4A3B-B470-9E2C390C8423}" type="datetimeFigureOut">
               <a:rPr lang="de-DE" smtClean="0"/>
-              <a:t>28.09.2016</a:t>
+              <a:t>30.09.2016</a:t>
             </a:fld>
             <a:endParaRPr lang="de-DE"/>
           </a:p>
@@ -6094,7 +6094,7 @@
           <a:p>
             <a:fld id="{5303484F-7B1F-4A3B-B470-9E2C390C8423}" type="datetimeFigureOut">
               <a:rPr lang="de-DE" smtClean="0"/>
-              <a:t>28.09.2016</a:t>
+              <a:t>30.09.2016</a:t>
             </a:fld>
             <a:endParaRPr lang="de-DE"/>
           </a:p>
@@ -6635,7 +6635,7 @@
           <a:p>
             <a:fld id="{5303484F-7B1F-4A3B-B470-9E2C390C8423}" type="datetimeFigureOut">
               <a:rPr lang="de-DE" smtClean="0"/>
-              <a:t>28.09.2016</a:t>
+              <a:t>30.09.2016</a:t>
             </a:fld>
             <a:endParaRPr lang="de-DE"/>
           </a:p>
@@ -6748,7 +6748,7 @@
           <a:p>
             <a:fld id="{5303484F-7B1F-4A3B-B470-9E2C390C8423}" type="datetimeFigureOut">
               <a:rPr lang="de-DE" smtClean="0"/>
-              <a:t>28.09.2016</a:t>
+              <a:t>30.09.2016</a:t>
             </a:fld>
             <a:endParaRPr lang="de-DE"/>
           </a:p>
@@ -8459,7 +8459,7 @@
           <a:p>
             <a:fld id="{5303484F-7B1F-4A3B-B470-9E2C390C8423}" type="datetimeFigureOut">
               <a:rPr lang="de-DE" smtClean="0"/>
-              <a:t>28.09.2016</a:t>
+              <a:t>30.09.2016</a:t>
             </a:fld>
             <a:endParaRPr lang="de-DE"/>
           </a:p>
@@ -8610,7 +8610,7 @@
           <a:p>
             <a:fld id="{5303484F-7B1F-4A3B-B470-9E2C390C8423}" type="datetimeFigureOut">
               <a:rPr lang="de-DE" smtClean="0"/>
-              <a:t>28.09.2016</a:t>
+              <a:t>30.09.2016</a:t>
             </a:fld>
             <a:endParaRPr lang="de-DE"/>
           </a:p>
@@ -12225,7 +12225,7 @@
           <a:p>
             <a:fld id="{5303484F-7B1F-4A3B-B470-9E2C390C8423}" type="datetimeFigureOut">
               <a:rPr lang="de-DE" smtClean="0"/>
-              <a:t>28.09.2016</a:t>
+              <a:t>30.09.2016</a:t>
             </a:fld>
             <a:endParaRPr lang="de-DE"/>
           </a:p>
@@ -14084,7 +14084,7 @@
           <a:p>
             <a:fld id="{5303484F-7B1F-4A3B-B470-9E2C390C8423}" type="datetimeFigureOut">
               <a:rPr lang="de-DE" smtClean="0"/>
-              <a:t>28.09.2016</a:t>
+              <a:t>30.09.2016</a:t>
             </a:fld>
             <a:endParaRPr lang="de-DE"/>
           </a:p>
@@ -14972,11 +14972,19 @@
             </a:r>
             <a:r>
               <a:rPr lang="de-DE" dirty="0"/>
-              <a:t> wurde nicht ausreichend benutzt in Bezug auf Fehlzeiten und  </a:t>
+              <a:t> wurde nicht ausreichend benutzt in Bezug auf Fehlzeiten und </a:t>
             </a:r>
             <a:r>
               <a:rPr lang="de-DE" dirty="0" smtClean="0"/>
-              <a:t>  Absprachen, mangelhafte </a:t>
+              <a:t>Absprachen</a:t>
+            </a:r>
+            <a:r>
+              <a:rPr lang="de-DE" dirty="0" smtClean="0"/>
+              <a:t>, </a:t>
+            </a:r>
+            <a:r>
+              <a:rPr lang="de-DE" dirty="0" smtClean="0"/>
+              <a:t>   mangelhafte </a:t>
             </a:r>
             <a:r>
               <a:rPr lang="de-DE" dirty="0"/>
@@ -15062,7 +15070,7 @@
         <p:spPr/>
         <p:txBody>
           <a:bodyPr>
-            <a:normAutofit lnSpcReduction="10000"/>
+            <a:normAutofit fontScale="92500" lnSpcReduction="10000"/>
           </a:bodyPr>
           <a:lstStyle/>
           <a:p>
@@ -15098,7 +15106,19 @@
             </a:pPr>
             <a:r>
               <a:rPr lang="de-DE" dirty="0" smtClean="0"/>
-              <a:t>Dies wurde von Angelina </a:t>
+              <a:t>Dies wurde von </a:t>
+            </a:r>
+            <a:r>
+              <a:rPr lang="de-DE" dirty="0" smtClean="0"/>
+              <a:t>Michael </a:t>
+            </a:r>
+            <a:r>
+              <a:rPr lang="de-DE" dirty="0" err="1" smtClean="0"/>
+              <a:t>Kohlhepp</a:t>
+            </a:r>
+            <a:r>
+              <a:rPr lang="de-DE" dirty="0" smtClean="0"/>
+              <a:t>, Angelina </a:t>
             </a:r>
             <a:r>
               <a:rPr lang="de-DE" dirty="0" err="1" smtClean="0"/>
@@ -15106,7 +15126,15 @@
             </a:r>
             <a:r>
               <a:rPr lang="de-DE" dirty="0" smtClean="0"/>
-              <a:t> behoben. </a:t>
+              <a:t>, Joachim Harms </a:t>
+            </a:r>
+            <a:r>
+              <a:rPr lang="de-DE" dirty="0" smtClean="0"/>
+              <a:t>behoben</a:t>
+            </a:r>
+            <a:r>
+              <a:rPr lang="de-DE" dirty="0" smtClean="0"/>
+              <a:t>. </a:t>
             </a:r>
             <a:endParaRPr lang="de-DE" dirty="0"/>
           </a:p>
@@ -15182,7 +15210,9 @@
         </p:nvSpPr>
         <p:spPr/>
         <p:txBody>
-          <a:bodyPr/>
+          <a:bodyPr>
+            <a:normAutofit fontScale="92500" lnSpcReduction="20000"/>
+          </a:bodyPr>
           <a:lstStyle/>
           <a:p>
             <a:pPr marL="0" indent="0">
@@ -15202,7 +15232,17 @@
           <a:p>
             <a:r>
               <a:rPr lang="de-DE" dirty="0" smtClean="0"/>
-              <a:t>Zeitplan wurde als Balkendiagramm modelliert und von Maya Schwenk überarbeitet</a:t>
+              <a:t>Zeitplan wurde als Balkendiagramm modelliert und von Maya Schwenk </a:t>
+            </a:r>
+            <a:r>
+              <a:rPr lang="de-DE" dirty="0" smtClean="0"/>
+              <a:t>überarbeitet</a:t>
+            </a:r>
+          </a:p>
+          <a:p>
+            <a:r>
+              <a:rPr lang="de-DE" dirty="0" smtClean="0"/>
+              <a:t>Probleme: Aufgrund von Fehltagen und Krankheiten und mangelnder Kommunikation teamintern kam es zu einigen Verschiebungen des Zeitplans. Da wir aber mit ausreichend Ressourcen vorgeplant haben, kam es zu keinen gravierenden Verzögerungen und das Projekt konnte zum geplanten Zeitpunkt realisiert werden. </a:t>
             </a:r>
             <a:endParaRPr lang="de-DE" dirty="0"/>
           </a:p>
@@ -15504,13 +15544,21 @@
           <a:p>
             <a:r>
               <a:rPr lang="de-DE" dirty="0" smtClean="0"/>
-              <a:t>Noch nicht erstellt.</a:t>
-            </a:r>
-          </a:p>
-          <a:p>
+              <a:t>Nicht </a:t>
+            </a:r>
             <a:r>
               <a:rPr lang="de-DE" dirty="0" smtClean="0"/>
-              <a:t>Bisher gab es keine großen Abweichungen. </a:t>
+              <a:t>erstellt.</a:t>
+            </a:r>
+          </a:p>
+          <a:p>
+            <a:r>
+              <a:rPr lang="de-DE" dirty="0" smtClean="0"/>
+              <a:t>Bisher gab es keine </a:t>
+            </a:r>
+            <a:r>
+              <a:rPr lang="de-DE" dirty="0" smtClean="0"/>
+              <a:t>gravierende Abweichungen. Siehe unter Punkt Zeitplan.  </a:t>
             </a:r>
             <a:endParaRPr lang="de-DE" dirty="0"/>
           </a:p>
@@ -15717,7 +15765,7 @@
             </a:r>
             <a:r>
               <a:rPr lang="de-DE" dirty="0" smtClean="0"/>
-              <a:t> begonnen zu erstellen. </a:t>
+              <a:t> erstellt. </a:t>
             </a:r>
             <a:endParaRPr lang="de-DE" dirty="0"/>
           </a:p>
@@ -16987,7 +17035,15 @@
           <a:p>
             <a:r>
               <a:rPr lang="de-DE" dirty="0" smtClean="0"/>
-              <a:t>Grundlage: Ausarbeitung auf Basis Lastenheft und Anwendungsfalldiagramm. Abnahme durch Auftraggeber. </a:t>
+              <a:t>Grundlage: Ausarbeitung auf Basis Lastenheft und Anwendungsfalldiagramm. </a:t>
+            </a:r>
+            <a:r>
+              <a:rPr lang="de-DE" dirty="0" smtClean="0"/>
+              <a:t>Im Team erstellt. Abnahme </a:t>
+            </a:r>
+            <a:r>
+              <a:rPr lang="de-DE" dirty="0" smtClean="0"/>
+              <a:t>durch Auftraggeber. </a:t>
             </a:r>
             <a:endParaRPr lang="de-DE" dirty="0"/>
           </a:p>

</xml_diff>